<commit_message>
x axis error fixed
</commit_message>
<xml_diff>
--- a/Week1-2_basics/HW1axes.pptx
+++ b/Week1-2_basics/HW1axes.pptx
@@ -105,6 +105,11 @@
       </a:defRPr>
     </a:lvl9pPr>
   </p:defaultTextStyle>
+  <p:extLst>
+    <p:ext uri="{EFAFB233-063F-42B5-8137-9DF3F51BA10A}">
+      <p15:sldGuideLst xmlns:p15="http://schemas.microsoft.com/office/powerpoint/2012/main"/>
+    </p:ext>
+  </p:extLst>
 </p:presentation>
 </file>
 
@@ -255,7 +260,7 @@
           <a:p>
             <a:fld id="{CF40A9CC-2ECD-724C-B257-D44144AED333}" type="datetimeFigureOut">
               <a:rPr lang="en-US" smtClean="0"/>
-              <a:t>9/6/21</a:t>
+              <a:t>9/7/22</a:t>
             </a:fld>
             <a:endParaRPr lang="en-US"/>
           </a:p>
@@ -453,7 +458,7 @@
           <a:p>
             <a:fld id="{CF40A9CC-2ECD-724C-B257-D44144AED333}" type="datetimeFigureOut">
               <a:rPr lang="en-US" smtClean="0"/>
-              <a:t>9/6/21</a:t>
+              <a:t>9/7/22</a:t>
             </a:fld>
             <a:endParaRPr lang="en-US"/>
           </a:p>
@@ -661,7 +666,7 @@
           <a:p>
             <a:fld id="{CF40A9CC-2ECD-724C-B257-D44144AED333}" type="datetimeFigureOut">
               <a:rPr lang="en-US" smtClean="0"/>
-              <a:t>9/6/21</a:t>
+              <a:t>9/7/22</a:t>
             </a:fld>
             <a:endParaRPr lang="en-US"/>
           </a:p>
@@ -859,7 +864,7 @@
           <a:p>
             <a:fld id="{CF40A9CC-2ECD-724C-B257-D44144AED333}" type="datetimeFigureOut">
               <a:rPr lang="en-US" smtClean="0"/>
-              <a:t>9/6/21</a:t>
+              <a:t>9/7/22</a:t>
             </a:fld>
             <a:endParaRPr lang="en-US"/>
           </a:p>
@@ -1134,7 +1139,7 @@
           <a:p>
             <a:fld id="{CF40A9CC-2ECD-724C-B257-D44144AED333}" type="datetimeFigureOut">
               <a:rPr lang="en-US" smtClean="0"/>
-              <a:t>9/6/21</a:t>
+              <a:t>9/7/22</a:t>
             </a:fld>
             <a:endParaRPr lang="en-US"/>
           </a:p>
@@ -1399,7 +1404,7 @@
           <a:p>
             <a:fld id="{CF40A9CC-2ECD-724C-B257-D44144AED333}" type="datetimeFigureOut">
               <a:rPr lang="en-US" smtClean="0"/>
-              <a:t>9/6/21</a:t>
+              <a:t>9/7/22</a:t>
             </a:fld>
             <a:endParaRPr lang="en-US"/>
           </a:p>
@@ -1811,7 +1816,7 @@
           <a:p>
             <a:fld id="{CF40A9CC-2ECD-724C-B257-D44144AED333}" type="datetimeFigureOut">
               <a:rPr lang="en-US" smtClean="0"/>
-              <a:t>9/6/21</a:t>
+              <a:t>9/7/22</a:t>
             </a:fld>
             <a:endParaRPr lang="en-US"/>
           </a:p>
@@ -1952,7 +1957,7 @@
           <a:p>
             <a:fld id="{CF40A9CC-2ECD-724C-B257-D44144AED333}" type="datetimeFigureOut">
               <a:rPr lang="en-US" smtClean="0"/>
-              <a:t>9/6/21</a:t>
+              <a:t>9/7/22</a:t>
             </a:fld>
             <a:endParaRPr lang="en-US"/>
           </a:p>
@@ -2065,7 +2070,7 @@
           <a:p>
             <a:fld id="{CF40A9CC-2ECD-724C-B257-D44144AED333}" type="datetimeFigureOut">
               <a:rPr lang="en-US" smtClean="0"/>
-              <a:t>9/6/21</a:t>
+              <a:t>9/7/22</a:t>
             </a:fld>
             <a:endParaRPr lang="en-US"/>
           </a:p>
@@ -2376,7 +2381,7 @@
           <a:p>
             <a:fld id="{CF40A9CC-2ECD-724C-B257-D44144AED333}" type="datetimeFigureOut">
               <a:rPr lang="en-US" smtClean="0"/>
-              <a:t>9/6/21</a:t>
+              <a:t>9/7/22</a:t>
             </a:fld>
             <a:endParaRPr lang="en-US"/>
           </a:p>
@@ -2664,7 +2669,7 @@
           <a:p>
             <a:fld id="{CF40A9CC-2ECD-724C-B257-D44144AED333}" type="datetimeFigureOut">
               <a:rPr lang="en-US" smtClean="0"/>
-              <a:t>9/6/21</a:t>
+              <a:t>9/7/22</a:t>
             </a:fld>
             <a:endParaRPr lang="en-US"/>
           </a:p>
@@ -2905,7 +2910,7 @@
           <a:p>
             <a:fld id="{CF40A9CC-2ECD-724C-B257-D44144AED333}" type="datetimeFigureOut">
               <a:rPr lang="en-US" smtClean="0"/>
-              <a:t>9/6/21</a:t>
+              <a:t>9/7/22</a:t>
             </a:fld>
             <a:endParaRPr lang="en-US"/>
           </a:p>
@@ -3573,7 +3578,7 @@
           </p:nvSpPr>
           <p:spPr>
             <a:xfrm>
-              <a:off x="4460135" y="3278070"/>
+              <a:off x="4707272" y="3278070"/>
               <a:ext cx="466794" cy="276999"/>
             </a:xfrm>
             <a:prstGeom prst="rect">
@@ -4094,7 +4099,7 @@
           </p:nvSpPr>
           <p:spPr>
             <a:xfrm>
-              <a:off x="2986925" y="3293170"/>
+              <a:off x="3440012" y="3293170"/>
               <a:ext cx="545342" cy="276999"/>
             </a:xfrm>
             <a:prstGeom prst="rect">

</xml_diff>